<commit_message>
Lab 02 - Adjustments in Process Simulations
</commit_message>
<xml_diff>
--- a/lab02/scada-lts/views/LAB_2-Scada_View.pptx
+++ b/lab02/scada-lts/views/LAB_2-Scada_View.pptx
@@ -262,7 +262,7 @@
           <a:p>
             <a:fld id="{7BB6E4EC-387F-4E42-9D5E-93AEBED950C0}" type="datetimeFigureOut">
               <a:rPr lang="pt-BR" smtClean="0"/>
-              <a:t>20/06/2023</a:t>
+              <a:t>21/06/2023</a:t>
             </a:fld>
             <a:endParaRPr lang="pt-BR"/>
           </a:p>
@@ -462,7 +462,7 @@
           <a:p>
             <a:fld id="{7BB6E4EC-387F-4E42-9D5E-93AEBED950C0}" type="datetimeFigureOut">
               <a:rPr lang="pt-BR" smtClean="0"/>
-              <a:t>20/06/2023</a:t>
+              <a:t>21/06/2023</a:t>
             </a:fld>
             <a:endParaRPr lang="pt-BR"/>
           </a:p>
@@ -672,7 +672,7 @@
           <a:p>
             <a:fld id="{7BB6E4EC-387F-4E42-9D5E-93AEBED950C0}" type="datetimeFigureOut">
               <a:rPr lang="pt-BR" smtClean="0"/>
-              <a:t>20/06/2023</a:t>
+              <a:t>21/06/2023</a:t>
             </a:fld>
             <a:endParaRPr lang="pt-BR"/>
           </a:p>
@@ -872,7 +872,7 @@
           <a:p>
             <a:fld id="{7BB6E4EC-387F-4E42-9D5E-93AEBED950C0}" type="datetimeFigureOut">
               <a:rPr lang="pt-BR" smtClean="0"/>
-              <a:t>20/06/2023</a:t>
+              <a:t>21/06/2023</a:t>
             </a:fld>
             <a:endParaRPr lang="pt-BR"/>
           </a:p>
@@ -1148,7 +1148,7 @@
           <a:p>
             <a:fld id="{7BB6E4EC-387F-4E42-9D5E-93AEBED950C0}" type="datetimeFigureOut">
               <a:rPr lang="pt-BR" smtClean="0"/>
-              <a:t>20/06/2023</a:t>
+              <a:t>21/06/2023</a:t>
             </a:fld>
             <a:endParaRPr lang="pt-BR"/>
           </a:p>
@@ -1416,7 +1416,7 @@
           <a:p>
             <a:fld id="{7BB6E4EC-387F-4E42-9D5E-93AEBED950C0}" type="datetimeFigureOut">
               <a:rPr lang="pt-BR" smtClean="0"/>
-              <a:t>20/06/2023</a:t>
+              <a:t>21/06/2023</a:t>
             </a:fld>
             <a:endParaRPr lang="pt-BR"/>
           </a:p>
@@ -1831,7 +1831,7 @@
           <a:p>
             <a:fld id="{7BB6E4EC-387F-4E42-9D5E-93AEBED950C0}" type="datetimeFigureOut">
               <a:rPr lang="pt-BR" smtClean="0"/>
-              <a:t>20/06/2023</a:t>
+              <a:t>21/06/2023</a:t>
             </a:fld>
             <a:endParaRPr lang="pt-BR"/>
           </a:p>
@@ -1973,7 +1973,7 @@
           <a:p>
             <a:fld id="{7BB6E4EC-387F-4E42-9D5E-93AEBED950C0}" type="datetimeFigureOut">
               <a:rPr lang="pt-BR" smtClean="0"/>
-              <a:t>20/06/2023</a:t>
+              <a:t>21/06/2023</a:t>
             </a:fld>
             <a:endParaRPr lang="pt-BR"/>
           </a:p>
@@ -2086,7 +2086,7 @@
           <a:p>
             <a:fld id="{7BB6E4EC-387F-4E42-9D5E-93AEBED950C0}" type="datetimeFigureOut">
               <a:rPr lang="pt-BR" smtClean="0"/>
-              <a:t>20/06/2023</a:t>
+              <a:t>21/06/2023</a:t>
             </a:fld>
             <a:endParaRPr lang="pt-BR"/>
           </a:p>
@@ -2399,7 +2399,7 @@
           <a:p>
             <a:fld id="{7BB6E4EC-387F-4E42-9D5E-93AEBED950C0}" type="datetimeFigureOut">
               <a:rPr lang="pt-BR" smtClean="0"/>
-              <a:t>20/06/2023</a:t>
+              <a:t>21/06/2023</a:t>
             </a:fld>
             <a:endParaRPr lang="pt-BR"/>
           </a:p>
@@ -2688,7 +2688,7 @@
           <a:p>
             <a:fld id="{7BB6E4EC-387F-4E42-9D5E-93AEBED950C0}" type="datetimeFigureOut">
               <a:rPr lang="pt-BR" smtClean="0"/>
-              <a:t>20/06/2023</a:t>
+              <a:t>21/06/2023</a:t>
             </a:fld>
             <a:endParaRPr lang="pt-BR"/>
           </a:p>
@@ -2931,7 +2931,7 @@
           <a:p>
             <a:fld id="{7BB6E4EC-387F-4E42-9D5E-93AEBED950C0}" type="datetimeFigureOut">
               <a:rPr lang="pt-BR" smtClean="0"/>
-              <a:t>20/06/2023</a:t>
+              <a:t>21/06/2023</a:t>
             </a:fld>
             <a:endParaRPr lang="pt-BR"/>
           </a:p>
@@ -20000,19 +20000,15 @@
         </p:nvSpPr>
         <p:spPr>
           <a:xfrm>
-            <a:off x="2377307" y="1291431"/>
-            <a:ext cx="572593" cy="215444"/>
+            <a:off x="2901252" y="1667649"/>
+            <a:ext cx="522900" cy="307777"/>
           </a:xfrm>
           <a:prstGeom prst="rect">
             <a:avLst/>
           </a:prstGeom>
           <a:noFill/>
           <a:ln>
-            <a:solidFill>
-              <a:schemeClr val="bg1">
-                <a:lumMod val="85000"/>
-              </a:schemeClr>
-            </a:solidFill>
+            <a:noFill/>
             <a:prstDash val="dash"/>
           </a:ln>
         </p:spPr>
@@ -20020,28 +20016,20 @@
           <a:bodyPr wrap="none" rtlCol="0">
             <a:spAutoFit/>
           </a:bodyPr>
-          <a:lstStyle/>
+          <a:lstStyle>
+            <a:defPPr>
+              <a:defRPr lang="pt-BR"/>
+            </a:defPPr>
+            <a:lvl1pPr>
+              <a:defRPr sz="800" b="1"/>
+            </a:lvl1pPr>
+          </a:lstStyle>
           <a:p>
-            <a:pPr algn="ctr"/>
             <a:r>
-              <a:rPr lang="pt-BR" sz="800" dirty="0">
-                <a:solidFill>
-                  <a:schemeClr val="bg1">
-                    <a:lumMod val="50000"/>
-                  </a:schemeClr>
-                </a:solidFill>
+              <a:rPr lang="pt-BR" sz="1400" dirty="0">
+                <a:cs typeface="Aharoni" panose="02010803020104030203" pitchFamily="2" charset="-79"/>
               </a:rPr>
-              <a:t>Tanque </a:t>
-            </a:r>
-            <a:r>
-              <a:rPr lang="pt-BR" sz="800" b="1" dirty="0">
-                <a:solidFill>
-                  <a:schemeClr val="bg1">
-                    <a:lumMod val="50000"/>
-                  </a:schemeClr>
-                </a:solidFill>
-              </a:rPr>
-              <a:t>1</a:t>
+              <a:t>TQ 1</a:t>
             </a:r>
           </a:p>
         </p:txBody>
@@ -22465,7 +22453,7 @@
         </p:nvSpPr>
         <p:spPr>
           <a:xfrm>
-            <a:off x="3831944" y="1000379"/>
+            <a:off x="3825720" y="828992"/>
             <a:ext cx="691215" cy="215444"/>
           </a:xfrm>
           <a:prstGeom prst="rect">
@@ -22473,11 +22461,7 @@
           </a:prstGeom>
           <a:noFill/>
           <a:ln>
-            <a:solidFill>
-              <a:schemeClr val="bg1">
-                <a:lumMod val="85000"/>
-              </a:schemeClr>
-            </a:solidFill>
+            <a:noFill/>
             <a:prstDash val="dash"/>
           </a:ln>
         </p:spPr>
@@ -22565,7 +22549,7 @@
         </p:nvSpPr>
         <p:spPr>
           <a:xfrm>
-            <a:off x="1181393" y="891232"/>
+            <a:off x="1181393" y="787535"/>
             <a:ext cx="686406" cy="215444"/>
           </a:xfrm>
           <a:prstGeom prst="rect">
@@ -22573,11 +22557,7 @@
           </a:prstGeom>
           <a:noFill/>
           <a:ln>
-            <a:solidFill>
-              <a:schemeClr val="bg1">
-                <a:lumMod val="85000"/>
-              </a:schemeClr>
-            </a:solidFill>
+            <a:noFill/>
             <a:prstDash val="dash"/>
           </a:ln>
         </p:spPr>
@@ -22745,7 +22725,7 @@
         </p:nvSpPr>
         <p:spPr>
           <a:xfrm>
-            <a:off x="1976363" y="1722765"/>
+            <a:off x="1900947" y="1864170"/>
             <a:ext cx="742511" cy="215444"/>
           </a:xfrm>
           <a:prstGeom prst="rect">
@@ -22784,7 +22764,7 @@
         </p:nvSpPr>
         <p:spPr>
           <a:xfrm>
-            <a:off x="1976363" y="2117238"/>
+            <a:off x="1900947" y="2211508"/>
             <a:ext cx="644728" cy="215444"/>
           </a:xfrm>
           <a:prstGeom prst="rect">
@@ -22823,7 +22803,7 @@
         </p:nvSpPr>
         <p:spPr>
           <a:xfrm>
-            <a:off x="1976363" y="2511711"/>
+            <a:off x="1900947" y="2615408"/>
             <a:ext cx="742511" cy="215444"/>
           </a:xfrm>
           <a:prstGeom prst="rect">
@@ -22845,62 +22825,6 @@
               <a:rPr lang="pt-BR" sz="800" b="1" dirty="0"/>
               <a:t>Temperatura</a:t>
             </a:r>
-          </a:p>
-        </p:txBody>
-      </p:sp>
-      <p:sp>
-        <p:nvSpPr>
-          <p:cNvPr id="474" name="Rectangle 473">
-            <a:extLst>
-              <a:ext uri="{FF2B5EF4-FFF2-40B4-BE49-F238E27FC236}">
-                <a16:creationId xmlns:a16="http://schemas.microsoft.com/office/drawing/2014/main" id="{22316ED8-A6F8-E84F-41D6-F6C1ADAA2839}"/>
-              </a:ext>
-            </a:extLst>
-          </p:cNvPr>
-          <p:cNvSpPr/>
-          <p:nvPr/>
-        </p:nvSpPr>
-        <p:spPr>
-          <a:xfrm>
-            <a:off x="2282926" y="3384624"/>
-            <a:ext cx="175072" cy="168172"/>
-          </a:xfrm>
-          <a:prstGeom prst="rect">
-            <a:avLst/>
-          </a:prstGeom>
-          <a:solidFill>
-            <a:schemeClr val="bg1"/>
-          </a:solidFill>
-          <a:ln>
-            <a:solidFill>
-              <a:schemeClr val="bg2">
-                <a:lumMod val="90000"/>
-              </a:schemeClr>
-            </a:solidFill>
-          </a:ln>
-        </p:spPr>
-        <p:style>
-          <a:lnRef idx="2">
-            <a:schemeClr val="accent1">
-              <a:shade val="50000"/>
-            </a:schemeClr>
-          </a:lnRef>
-          <a:fillRef idx="1">
-            <a:schemeClr val="accent1"/>
-          </a:fillRef>
-          <a:effectRef idx="0">
-            <a:schemeClr val="accent1"/>
-          </a:effectRef>
-          <a:fontRef idx="minor">
-            <a:schemeClr val="lt1"/>
-          </a:fontRef>
-        </p:style>
-        <p:txBody>
-          <a:bodyPr rtlCol="0" anchor="ctr"/>
-          <a:lstStyle/>
-          <a:p>
-            <a:pPr algn="ctr"/>
-            <a:endParaRPr lang="pt-BR" sz="1600"/>
           </a:p>
         </p:txBody>
       </p:sp>

</xml_diff>

<commit_message>
Lab 02 - Tests & SCADA screen adjustments
</commit_message>
<xml_diff>
--- a/lab02/scada-lts/views/LAB_2-Scada_View.pptx
+++ b/lab02/scada-lts/views/LAB_2-Scada_View.pptx
@@ -263,7 +263,7 @@
           <a:p>
             <a:fld id="{7BB6E4EC-387F-4E42-9D5E-93AEBED950C0}" type="datetimeFigureOut">
               <a:rPr lang="pt-BR" smtClean="0"/>
-              <a:t>22/06/2023</a:t>
+              <a:t>26/06/2023</a:t>
             </a:fld>
             <a:endParaRPr lang="pt-BR"/>
           </a:p>
@@ -463,7 +463,7 @@
           <a:p>
             <a:fld id="{7BB6E4EC-387F-4E42-9D5E-93AEBED950C0}" type="datetimeFigureOut">
               <a:rPr lang="pt-BR" smtClean="0"/>
-              <a:t>22/06/2023</a:t>
+              <a:t>26/06/2023</a:t>
             </a:fld>
             <a:endParaRPr lang="pt-BR"/>
           </a:p>
@@ -673,7 +673,7 @@
           <a:p>
             <a:fld id="{7BB6E4EC-387F-4E42-9D5E-93AEBED950C0}" type="datetimeFigureOut">
               <a:rPr lang="pt-BR" smtClean="0"/>
-              <a:t>22/06/2023</a:t>
+              <a:t>26/06/2023</a:t>
             </a:fld>
             <a:endParaRPr lang="pt-BR"/>
           </a:p>
@@ -873,7 +873,7 @@
           <a:p>
             <a:fld id="{7BB6E4EC-387F-4E42-9D5E-93AEBED950C0}" type="datetimeFigureOut">
               <a:rPr lang="pt-BR" smtClean="0"/>
-              <a:t>22/06/2023</a:t>
+              <a:t>26/06/2023</a:t>
             </a:fld>
             <a:endParaRPr lang="pt-BR"/>
           </a:p>
@@ -1149,7 +1149,7 @@
           <a:p>
             <a:fld id="{7BB6E4EC-387F-4E42-9D5E-93AEBED950C0}" type="datetimeFigureOut">
               <a:rPr lang="pt-BR" smtClean="0"/>
-              <a:t>22/06/2023</a:t>
+              <a:t>26/06/2023</a:t>
             </a:fld>
             <a:endParaRPr lang="pt-BR"/>
           </a:p>
@@ -1417,7 +1417,7 @@
           <a:p>
             <a:fld id="{7BB6E4EC-387F-4E42-9D5E-93AEBED950C0}" type="datetimeFigureOut">
               <a:rPr lang="pt-BR" smtClean="0"/>
-              <a:t>22/06/2023</a:t>
+              <a:t>26/06/2023</a:t>
             </a:fld>
             <a:endParaRPr lang="pt-BR"/>
           </a:p>
@@ -1832,7 +1832,7 @@
           <a:p>
             <a:fld id="{7BB6E4EC-387F-4E42-9D5E-93AEBED950C0}" type="datetimeFigureOut">
               <a:rPr lang="pt-BR" smtClean="0"/>
-              <a:t>22/06/2023</a:t>
+              <a:t>26/06/2023</a:t>
             </a:fld>
             <a:endParaRPr lang="pt-BR"/>
           </a:p>
@@ -1974,7 +1974,7 @@
           <a:p>
             <a:fld id="{7BB6E4EC-387F-4E42-9D5E-93AEBED950C0}" type="datetimeFigureOut">
               <a:rPr lang="pt-BR" smtClean="0"/>
-              <a:t>22/06/2023</a:t>
+              <a:t>26/06/2023</a:t>
             </a:fld>
             <a:endParaRPr lang="pt-BR"/>
           </a:p>
@@ -2087,7 +2087,7 @@
           <a:p>
             <a:fld id="{7BB6E4EC-387F-4E42-9D5E-93AEBED950C0}" type="datetimeFigureOut">
               <a:rPr lang="pt-BR" smtClean="0"/>
-              <a:t>22/06/2023</a:t>
+              <a:t>26/06/2023</a:t>
             </a:fld>
             <a:endParaRPr lang="pt-BR"/>
           </a:p>
@@ -2400,7 +2400,7 @@
           <a:p>
             <a:fld id="{7BB6E4EC-387F-4E42-9D5E-93AEBED950C0}" type="datetimeFigureOut">
               <a:rPr lang="pt-BR" smtClean="0"/>
-              <a:t>22/06/2023</a:t>
+              <a:t>26/06/2023</a:t>
             </a:fld>
             <a:endParaRPr lang="pt-BR"/>
           </a:p>
@@ -2689,7 +2689,7 @@
           <a:p>
             <a:fld id="{7BB6E4EC-387F-4E42-9D5E-93AEBED950C0}" type="datetimeFigureOut">
               <a:rPr lang="pt-BR" smtClean="0"/>
-              <a:t>22/06/2023</a:t>
+              <a:t>26/06/2023</a:t>
             </a:fld>
             <a:endParaRPr lang="pt-BR"/>
           </a:p>
@@ -2932,7 +2932,7 @@
           <a:p>
             <a:fld id="{7BB6E4EC-387F-4E42-9D5E-93AEBED950C0}" type="datetimeFigureOut">
               <a:rPr lang="pt-BR" smtClean="0"/>
-              <a:t>22/06/2023</a:t>
+              <a:t>26/06/2023</a:t>
             </a:fld>
             <a:endParaRPr lang="pt-BR"/>
           </a:p>
@@ -34144,9 +34144,7 @@
           </a:prstGeom>
           <a:noFill/>
           <a:ln>
-            <a:solidFill>
-              <a:schemeClr val="tx1"/>
-            </a:solidFill>
+            <a:noFill/>
             <a:prstDash val="dash"/>
           </a:ln>
         </p:spPr>
@@ -37612,8 +37610,8 @@
         </p:nvSpPr>
         <p:spPr>
           <a:xfrm>
-            <a:off x="1181393" y="1457467"/>
-            <a:ext cx="686406" cy="215444"/>
+            <a:off x="1408148" y="1457467"/>
+            <a:ext cx="515706" cy="215444"/>
           </a:xfrm>
           <a:prstGeom prst="rect">
             <a:avLst/>
@@ -37668,7 +37666,7 @@
         </p:nvSpPr>
         <p:spPr>
           <a:xfrm>
-            <a:off x="3705372" y="3453437"/>
+            <a:off x="3705372" y="3378021"/>
             <a:ext cx="620269" cy="215444"/>
           </a:xfrm>
           <a:prstGeom prst="rect">
@@ -37676,11 +37674,7 @@
           </a:prstGeom>
           <a:noFill/>
           <a:ln>
-            <a:solidFill>
-              <a:schemeClr val="bg1">
-                <a:lumMod val="85000"/>
-              </a:schemeClr>
-            </a:solidFill>
+            <a:noFill/>
             <a:prstDash val="dash"/>
           </a:ln>
         </p:spPr>
@@ -37728,7 +37722,7 @@
         </p:nvSpPr>
         <p:spPr>
           <a:xfrm>
-            <a:off x="4740223" y="3607431"/>
+            <a:off x="4938983" y="3521119"/>
             <a:ext cx="644116" cy="215444"/>
           </a:xfrm>
           <a:prstGeom prst="rect">
@@ -37736,11 +37730,7 @@
           </a:prstGeom>
           <a:noFill/>
           <a:ln>
-            <a:solidFill>
-              <a:schemeClr val="bg1">
-                <a:lumMod val="85000"/>
-              </a:schemeClr>
-            </a:solidFill>
+            <a:noFill/>
             <a:prstDash val="dash"/>
           </a:ln>
         </p:spPr>
@@ -42689,9 +42679,7 @@
           </a:prstGeom>
           <a:noFill/>
           <a:ln>
-            <a:solidFill>
-              <a:schemeClr val="tx1"/>
-            </a:solidFill>
+            <a:noFill/>
             <a:prstDash val="dash"/>
           </a:ln>
         </p:spPr>
@@ -46157,8 +46145,8 @@
         </p:nvSpPr>
         <p:spPr>
           <a:xfrm>
-            <a:off x="5127211" y="577790"/>
-            <a:ext cx="686406" cy="215444"/>
+            <a:off x="5351421" y="579204"/>
+            <a:ext cx="515706" cy="215444"/>
           </a:xfrm>
           <a:prstGeom prst="rect">
             <a:avLst/>
@@ -46213,7 +46201,7 @@
         </p:nvSpPr>
         <p:spPr>
           <a:xfrm>
-            <a:off x="7642138" y="2573760"/>
+            <a:off x="7642138" y="2488917"/>
             <a:ext cx="620269" cy="215444"/>
           </a:xfrm>
           <a:prstGeom prst="rect">
@@ -46221,11 +46209,7 @@
           </a:prstGeom>
           <a:noFill/>
           <a:ln>
-            <a:solidFill>
-              <a:schemeClr val="bg1">
-                <a:lumMod val="85000"/>
-              </a:schemeClr>
-            </a:solidFill>
+            <a:noFill/>
             <a:prstDash val="dash"/>
           </a:ln>
         </p:spPr>
@@ -46273,7 +46257,7 @@
         </p:nvSpPr>
         <p:spPr>
           <a:xfrm>
-            <a:off x="8695094" y="2727754"/>
+            <a:off x="8864779" y="2633484"/>
             <a:ext cx="644116" cy="215444"/>
           </a:xfrm>
           <a:prstGeom prst="rect">
@@ -46281,11 +46265,7 @@
           </a:prstGeom>
           <a:noFill/>
           <a:ln>
-            <a:solidFill>
-              <a:schemeClr val="bg1">
-                <a:lumMod val="85000"/>
-              </a:schemeClr>
-            </a:solidFill>
+            <a:noFill/>
             <a:prstDash val="dash"/>
           </a:ln>
         </p:spPr>

</xml_diff>

<commit_message>
Lab 02 - Adding TQ3
</commit_message>
<xml_diff>
--- a/lab02/scada-lts/views/LAB_2-Scada_View.pptx
+++ b/lab02/scada-lts/views/LAB_2-Scada_View.pptx
@@ -263,7 +263,7 @@
           <a:p>
             <a:fld id="{7BB6E4EC-387F-4E42-9D5E-93AEBED950C0}" type="datetimeFigureOut">
               <a:rPr lang="pt-BR" smtClean="0"/>
-              <a:t>26/06/2023</a:t>
+              <a:t>30/06/2023</a:t>
             </a:fld>
             <a:endParaRPr lang="pt-BR"/>
           </a:p>
@@ -463,7 +463,7 @@
           <a:p>
             <a:fld id="{7BB6E4EC-387F-4E42-9D5E-93AEBED950C0}" type="datetimeFigureOut">
               <a:rPr lang="pt-BR" smtClean="0"/>
-              <a:t>26/06/2023</a:t>
+              <a:t>30/06/2023</a:t>
             </a:fld>
             <a:endParaRPr lang="pt-BR"/>
           </a:p>
@@ -673,7 +673,7 @@
           <a:p>
             <a:fld id="{7BB6E4EC-387F-4E42-9D5E-93AEBED950C0}" type="datetimeFigureOut">
               <a:rPr lang="pt-BR" smtClean="0"/>
-              <a:t>26/06/2023</a:t>
+              <a:t>30/06/2023</a:t>
             </a:fld>
             <a:endParaRPr lang="pt-BR"/>
           </a:p>
@@ -873,7 +873,7 @@
           <a:p>
             <a:fld id="{7BB6E4EC-387F-4E42-9D5E-93AEBED950C0}" type="datetimeFigureOut">
               <a:rPr lang="pt-BR" smtClean="0"/>
-              <a:t>26/06/2023</a:t>
+              <a:t>30/06/2023</a:t>
             </a:fld>
             <a:endParaRPr lang="pt-BR"/>
           </a:p>
@@ -1149,7 +1149,7 @@
           <a:p>
             <a:fld id="{7BB6E4EC-387F-4E42-9D5E-93AEBED950C0}" type="datetimeFigureOut">
               <a:rPr lang="pt-BR" smtClean="0"/>
-              <a:t>26/06/2023</a:t>
+              <a:t>30/06/2023</a:t>
             </a:fld>
             <a:endParaRPr lang="pt-BR"/>
           </a:p>
@@ -1417,7 +1417,7 @@
           <a:p>
             <a:fld id="{7BB6E4EC-387F-4E42-9D5E-93AEBED950C0}" type="datetimeFigureOut">
               <a:rPr lang="pt-BR" smtClean="0"/>
-              <a:t>26/06/2023</a:t>
+              <a:t>30/06/2023</a:t>
             </a:fld>
             <a:endParaRPr lang="pt-BR"/>
           </a:p>
@@ -1832,7 +1832,7 @@
           <a:p>
             <a:fld id="{7BB6E4EC-387F-4E42-9D5E-93AEBED950C0}" type="datetimeFigureOut">
               <a:rPr lang="pt-BR" smtClean="0"/>
-              <a:t>26/06/2023</a:t>
+              <a:t>30/06/2023</a:t>
             </a:fld>
             <a:endParaRPr lang="pt-BR"/>
           </a:p>
@@ -1974,7 +1974,7 @@
           <a:p>
             <a:fld id="{7BB6E4EC-387F-4E42-9D5E-93AEBED950C0}" type="datetimeFigureOut">
               <a:rPr lang="pt-BR" smtClean="0"/>
-              <a:t>26/06/2023</a:t>
+              <a:t>30/06/2023</a:t>
             </a:fld>
             <a:endParaRPr lang="pt-BR"/>
           </a:p>
@@ -2087,7 +2087,7 @@
           <a:p>
             <a:fld id="{7BB6E4EC-387F-4E42-9D5E-93AEBED950C0}" type="datetimeFigureOut">
               <a:rPr lang="pt-BR" smtClean="0"/>
-              <a:t>26/06/2023</a:t>
+              <a:t>30/06/2023</a:t>
             </a:fld>
             <a:endParaRPr lang="pt-BR"/>
           </a:p>
@@ -2400,7 +2400,7 @@
           <a:p>
             <a:fld id="{7BB6E4EC-387F-4E42-9D5E-93AEBED950C0}" type="datetimeFigureOut">
               <a:rPr lang="pt-BR" smtClean="0"/>
-              <a:t>26/06/2023</a:t>
+              <a:t>30/06/2023</a:t>
             </a:fld>
             <a:endParaRPr lang="pt-BR"/>
           </a:p>
@@ -2689,7 +2689,7 @@
           <a:p>
             <a:fld id="{7BB6E4EC-387F-4E42-9D5E-93AEBED950C0}" type="datetimeFigureOut">
               <a:rPr lang="pt-BR" smtClean="0"/>
-              <a:t>26/06/2023</a:t>
+              <a:t>30/06/2023</a:t>
             </a:fld>
             <a:endParaRPr lang="pt-BR"/>
           </a:p>
@@ -2932,7 +2932,7 @@
           <a:p>
             <a:fld id="{7BB6E4EC-387F-4E42-9D5E-93AEBED950C0}" type="datetimeFigureOut">
               <a:rPr lang="pt-BR" smtClean="0"/>
-              <a:t>26/06/2023</a:t>
+              <a:t>30/06/2023</a:t>
             </a:fld>
             <a:endParaRPr lang="pt-BR"/>
           </a:p>
@@ -39718,9 +39718,7 @@
           </a:prstGeom>
           <a:noFill/>
           <a:ln>
-            <a:solidFill>
-              <a:schemeClr val="tx1"/>
-            </a:solidFill>
+            <a:noFill/>
             <a:prstDash val="dash"/>
           </a:ln>
         </p:spPr>
@@ -40457,79 +40455,6 @@
           </p:txBody>
         </p:sp>
       </p:grpSp>
-      <p:sp>
-        <p:nvSpPr>
-          <p:cNvPr id="29" name="TextBox 28">
-            <a:extLst>
-              <a:ext uri="{FF2B5EF4-FFF2-40B4-BE49-F238E27FC236}">
-                <a16:creationId xmlns:a16="http://schemas.microsoft.com/office/drawing/2014/main" id="{6C6AAF65-4011-0356-0B03-3FEE78426FA8}"/>
-              </a:ext>
-            </a:extLst>
-          </p:cNvPr>
-          <p:cNvSpPr txBox="1"/>
-          <p:nvPr/>
-        </p:nvSpPr>
-        <p:spPr>
-          <a:xfrm>
-            <a:off x="8863967" y="4022838"/>
-            <a:ext cx="572593" cy="338554"/>
-          </a:xfrm>
-          <a:prstGeom prst="rect">
-            <a:avLst/>
-          </a:prstGeom>
-          <a:noFill/>
-          <a:ln>
-            <a:solidFill>
-              <a:schemeClr val="bg1">
-                <a:lumMod val="85000"/>
-              </a:schemeClr>
-            </a:solidFill>
-            <a:prstDash val="dash"/>
-          </a:ln>
-        </p:spPr>
-        <p:txBody>
-          <a:bodyPr wrap="none" rtlCol="0">
-            <a:spAutoFit/>
-          </a:bodyPr>
-          <a:lstStyle/>
-          <a:p>
-            <a:pPr algn="ctr"/>
-            <a:r>
-              <a:rPr lang="pt-BR" sz="800" dirty="0">
-                <a:solidFill>
-                  <a:schemeClr val="bg1">
-                    <a:lumMod val="50000"/>
-                  </a:schemeClr>
-                </a:solidFill>
-              </a:rPr>
-              <a:t>Tanque </a:t>
-            </a:r>
-            <a:r>
-              <a:rPr lang="pt-BR" sz="800" b="1" dirty="0">
-                <a:solidFill>
-                  <a:schemeClr val="bg1">
-                    <a:lumMod val="50000"/>
-                  </a:schemeClr>
-                </a:solidFill>
-              </a:rPr>
-              <a:t>3</a:t>
-            </a:r>
-          </a:p>
-          <a:p>
-            <a:pPr algn="ctr"/>
-            <a:r>
-              <a:rPr lang="pt-BR" sz="800" dirty="0">
-                <a:solidFill>
-                  <a:schemeClr val="bg1">
-                    <a:lumMod val="50000"/>
-                  </a:schemeClr>
-                </a:solidFill>
-              </a:rPr>
-              <a:t>Mistura</a:t>
-            </a:r>
-          </a:p>
-        </p:txBody>
-      </p:sp>
       <p:sp>
         <p:nvSpPr>
           <p:cNvPr id="30" name="Rectangle 29">
@@ -41343,7 +41268,7 @@
         </p:nvCxnSpPr>
         <p:spPr>
           <a:xfrm>
-            <a:off x="9771054" y="6364366"/>
+            <a:off x="9525956" y="6364366"/>
             <a:ext cx="313586" cy="0"/>
           </a:xfrm>
           <a:prstGeom prst="straightConnector1">
@@ -41522,19 +41447,15 @@
         </p:nvSpPr>
         <p:spPr>
           <a:xfrm>
-            <a:off x="10096111" y="5800229"/>
-            <a:ext cx="779381" cy="215444"/>
+            <a:off x="10342854" y="5687105"/>
+            <a:ext cx="644116" cy="215444"/>
           </a:xfrm>
           <a:prstGeom prst="rect">
             <a:avLst/>
           </a:prstGeom>
           <a:noFill/>
           <a:ln>
-            <a:solidFill>
-              <a:schemeClr val="bg1">
-                <a:lumMod val="85000"/>
-              </a:schemeClr>
-            </a:solidFill>
+            <a:noFill/>
             <a:prstDash val="dash"/>
           </a:ln>
         </p:spPr>
@@ -41565,431 +41486,6 @@
               </a:rPr>
               <a:t>3.OUT</a:t>
             </a:r>
-          </a:p>
-        </p:txBody>
-      </p:sp>
-      <p:grpSp>
-        <p:nvGrpSpPr>
-          <p:cNvPr id="238" name="Group 237">
-            <a:extLst>
-              <a:ext uri="{FF2B5EF4-FFF2-40B4-BE49-F238E27FC236}">
-                <a16:creationId xmlns:a16="http://schemas.microsoft.com/office/drawing/2014/main" id="{7DDC435E-60FF-27DD-C4DD-D37AAE578C1F}"/>
-              </a:ext>
-            </a:extLst>
-          </p:cNvPr>
-          <p:cNvGrpSpPr/>
-          <p:nvPr/>
-        </p:nvGrpSpPr>
-        <p:grpSpPr>
-          <a:xfrm>
-            <a:off x="8463022" y="4567389"/>
-            <a:ext cx="854721" cy="1131635"/>
-            <a:chOff x="1681388" y="5155653"/>
-            <a:chExt cx="940193" cy="1244799"/>
-          </a:xfrm>
-        </p:grpSpPr>
-        <p:grpSp>
-          <p:nvGrpSpPr>
-            <p:cNvPr id="676" name="Group 675">
-              <a:extLst>
-                <a:ext uri="{FF2B5EF4-FFF2-40B4-BE49-F238E27FC236}">
-                  <a16:creationId xmlns:a16="http://schemas.microsoft.com/office/drawing/2014/main" id="{D2CF5849-22DC-BAF3-F17D-03175B8FEF25}"/>
-                </a:ext>
-              </a:extLst>
-            </p:cNvPr>
-            <p:cNvGrpSpPr/>
-            <p:nvPr/>
-          </p:nvGrpSpPr>
-          <p:grpSpPr>
-            <a:xfrm>
-              <a:off x="1681388" y="5155653"/>
-              <a:ext cx="924325" cy="376960"/>
-              <a:chOff x="1984319" y="926553"/>
-              <a:chExt cx="924325" cy="376960"/>
-            </a:xfrm>
-          </p:grpSpPr>
-          <p:sp>
-            <p:nvSpPr>
-              <p:cNvPr id="683" name="TextBox 682">
-                <a:extLst>
-                  <a:ext uri="{FF2B5EF4-FFF2-40B4-BE49-F238E27FC236}">
-                    <a16:creationId xmlns:a16="http://schemas.microsoft.com/office/drawing/2014/main" id="{02868254-3689-7E56-79CF-23A38B948B67}"/>
-                  </a:ext>
-                </a:extLst>
-              </p:cNvPr>
-              <p:cNvSpPr txBox="1"/>
-              <p:nvPr/>
-            </p:nvSpPr>
-            <p:spPr>
-              <a:xfrm>
-                <a:off x="1984319" y="926553"/>
-                <a:ext cx="924325" cy="236988"/>
-              </a:xfrm>
-              <a:prstGeom prst="rect">
-                <a:avLst/>
-              </a:prstGeom>
-              <a:noFill/>
-              <a:ln>
-                <a:noFill/>
-                <a:prstDash val="dash"/>
-              </a:ln>
-            </p:spPr>
-            <p:txBody>
-              <a:bodyPr wrap="none" rtlCol="0">
-                <a:spAutoFit/>
-              </a:bodyPr>
-              <a:lstStyle/>
-              <a:p>
-                <a:r>
-                  <a:rPr lang="pt-BR" sz="800" b="1" dirty="0"/>
-                  <a:t>Nível Tanque %</a:t>
-                </a:r>
-              </a:p>
-            </p:txBody>
-          </p:sp>
-          <p:sp>
-            <p:nvSpPr>
-              <p:cNvPr id="684" name="Rectangle 683">
-                <a:extLst>
-                  <a:ext uri="{FF2B5EF4-FFF2-40B4-BE49-F238E27FC236}">
-                    <a16:creationId xmlns:a16="http://schemas.microsoft.com/office/drawing/2014/main" id="{6141272E-4E65-58A4-E1B3-C95D967A0DDA}"/>
-                  </a:ext>
-                </a:extLst>
-              </p:cNvPr>
-              <p:cNvSpPr/>
-              <p:nvPr/>
-            </p:nvSpPr>
-            <p:spPr>
-              <a:xfrm>
-                <a:off x="2082354" y="1118524"/>
-                <a:ext cx="804451" cy="184989"/>
-              </a:xfrm>
-              <a:prstGeom prst="rect">
-                <a:avLst/>
-              </a:prstGeom>
-              <a:solidFill>
-                <a:schemeClr val="bg1"/>
-              </a:solidFill>
-              <a:ln>
-                <a:solidFill>
-                  <a:schemeClr val="bg2">
-                    <a:lumMod val="90000"/>
-                  </a:schemeClr>
-                </a:solidFill>
-              </a:ln>
-            </p:spPr>
-            <p:style>
-              <a:lnRef idx="2">
-                <a:schemeClr val="accent1">
-                  <a:shade val="50000"/>
-                </a:schemeClr>
-              </a:lnRef>
-              <a:fillRef idx="1">
-                <a:schemeClr val="accent1"/>
-              </a:fillRef>
-              <a:effectRef idx="0">
-                <a:schemeClr val="accent1"/>
-              </a:effectRef>
-              <a:fontRef idx="minor">
-                <a:schemeClr val="lt1"/>
-              </a:fontRef>
-            </p:style>
-            <p:txBody>
-              <a:bodyPr rtlCol="0" anchor="ctr"/>
-              <a:lstStyle/>
-              <a:p>
-                <a:pPr algn="ctr"/>
-                <a:endParaRPr lang="pt-BR" sz="1600"/>
-              </a:p>
-            </p:txBody>
-          </p:sp>
-        </p:grpSp>
-        <p:grpSp>
-          <p:nvGrpSpPr>
-            <p:cNvPr id="677" name="Group 676">
-              <a:extLst>
-                <a:ext uri="{FF2B5EF4-FFF2-40B4-BE49-F238E27FC236}">
-                  <a16:creationId xmlns:a16="http://schemas.microsoft.com/office/drawing/2014/main" id="{C212152B-C492-B91D-2DF1-9E430FDA2859}"/>
-                </a:ext>
-              </a:extLst>
-            </p:cNvPr>
-            <p:cNvGrpSpPr/>
-            <p:nvPr/>
-          </p:nvGrpSpPr>
-          <p:grpSpPr>
-            <a:xfrm>
-              <a:off x="1681388" y="5589573"/>
-              <a:ext cx="902486" cy="376960"/>
-              <a:chOff x="1984319" y="926553"/>
-              <a:chExt cx="902486" cy="376960"/>
-            </a:xfrm>
-          </p:grpSpPr>
-          <p:sp>
-            <p:nvSpPr>
-              <p:cNvPr id="681" name="TextBox 680">
-                <a:extLst>
-                  <a:ext uri="{FF2B5EF4-FFF2-40B4-BE49-F238E27FC236}">
-                    <a16:creationId xmlns:a16="http://schemas.microsoft.com/office/drawing/2014/main" id="{A0F93330-EC8E-C6C6-C21C-A81E3ECD5980}"/>
-                  </a:ext>
-                </a:extLst>
-              </p:cNvPr>
-              <p:cNvSpPr txBox="1"/>
-              <p:nvPr/>
-            </p:nvSpPr>
-            <p:spPr>
-              <a:xfrm>
-                <a:off x="1984319" y="926553"/>
-                <a:ext cx="883768" cy="236988"/>
-              </a:xfrm>
-              <a:prstGeom prst="rect">
-                <a:avLst/>
-              </a:prstGeom>
-              <a:noFill/>
-              <a:ln>
-                <a:noFill/>
-                <a:prstDash val="dash"/>
-              </a:ln>
-            </p:spPr>
-            <p:txBody>
-              <a:bodyPr wrap="none" rtlCol="0">
-                <a:spAutoFit/>
-              </a:bodyPr>
-              <a:lstStyle/>
-              <a:p>
-                <a:r>
-                  <a:rPr lang="pt-BR" sz="800" b="1" dirty="0"/>
-                  <a:t>Quant. Litros L</a:t>
-                </a:r>
-              </a:p>
-            </p:txBody>
-          </p:sp>
-          <p:sp>
-            <p:nvSpPr>
-              <p:cNvPr id="682" name="Rectangle 681">
-                <a:extLst>
-                  <a:ext uri="{FF2B5EF4-FFF2-40B4-BE49-F238E27FC236}">
-                    <a16:creationId xmlns:a16="http://schemas.microsoft.com/office/drawing/2014/main" id="{FC0AC0C7-7331-9855-17D3-331D4D149D87}"/>
-                  </a:ext>
-                </a:extLst>
-              </p:cNvPr>
-              <p:cNvSpPr/>
-              <p:nvPr/>
-            </p:nvSpPr>
-            <p:spPr>
-              <a:xfrm>
-                <a:off x="2082354" y="1118524"/>
-                <a:ext cx="804451" cy="184989"/>
-              </a:xfrm>
-              <a:prstGeom prst="rect">
-                <a:avLst/>
-              </a:prstGeom>
-              <a:solidFill>
-                <a:schemeClr val="bg1"/>
-              </a:solidFill>
-              <a:ln>
-                <a:solidFill>
-                  <a:schemeClr val="bg2">
-                    <a:lumMod val="90000"/>
-                  </a:schemeClr>
-                </a:solidFill>
-              </a:ln>
-            </p:spPr>
-            <p:style>
-              <a:lnRef idx="2">
-                <a:schemeClr val="accent1">
-                  <a:shade val="50000"/>
-                </a:schemeClr>
-              </a:lnRef>
-              <a:fillRef idx="1">
-                <a:schemeClr val="accent1"/>
-              </a:fillRef>
-              <a:effectRef idx="0">
-                <a:schemeClr val="accent1"/>
-              </a:effectRef>
-              <a:fontRef idx="minor">
-                <a:schemeClr val="lt1"/>
-              </a:fontRef>
-            </p:style>
-            <p:txBody>
-              <a:bodyPr rtlCol="0" anchor="ctr"/>
-              <a:lstStyle/>
-              <a:p>
-                <a:pPr algn="ctr"/>
-                <a:endParaRPr lang="pt-BR" sz="1600"/>
-              </a:p>
-            </p:txBody>
-          </p:sp>
-        </p:grpSp>
-        <p:grpSp>
-          <p:nvGrpSpPr>
-            <p:cNvPr id="678" name="Group 677">
-              <a:extLst>
-                <a:ext uri="{FF2B5EF4-FFF2-40B4-BE49-F238E27FC236}">
-                  <a16:creationId xmlns:a16="http://schemas.microsoft.com/office/drawing/2014/main" id="{291EBFEE-4270-5561-68E1-DBB8BF98585B}"/>
-                </a:ext>
-              </a:extLst>
-            </p:cNvPr>
-            <p:cNvGrpSpPr/>
-            <p:nvPr/>
-          </p:nvGrpSpPr>
-          <p:grpSpPr>
-            <a:xfrm>
-              <a:off x="1681388" y="6023492"/>
-              <a:ext cx="940193" cy="376960"/>
-              <a:chOff x="1984319" y="926553"/>
-              <a:chExt cx="940193" cy="376960"/>
-            </a:xfrm>
-          </p:grpSpPr>
-          <p:sp>
-            <p:nvSpPr>
-              <p:cNvPr id="679" name="TextBox 678">
-                <a:extLst>
-                  <a:ext uri="{FF2B5EF4-FFF2-40B4-BE49-F238E27FC236}">
-                    <a16:creationId xmlns:a16="http://schemas.microsoft.com/office/drawing/2014/main" id="{E88631DF-5460-4D45-E800-A738727D2409}"/>
-                  </a:ext>
-                </a:extLst>
-              </p:cNvPr>
-              <p:cNvSpPr txBox="1"/>
-              <p:nvPr/>
-            </p:nvSpPr>
-            <p:spPr>
-              <a:xfrm>
-                <a:off x="1984319" y="926553"/>
-                <a:ext cx="940193" cy="236988"/>
-              </a:xfrm>
-              <a:prstGeom prst="rect">
-                <a:avLst/>
-              </a:prstGeom>
-              <a:noFill/>
-              <a:ln>
-                <a:noFill/>
-                <a:prstDash val="dash"/>
-              </a:ln>
-            </p:spPr>
-            <p:txBody>
-              <a:bodyPr wrap="none" rtlCol="0">
-                <a:spAutoFit/>
-              </a:bodyPr>
-              <a:lstStyle/>
-              <a:p>
-                <a:r>
-                  <a:rPr lang="pt-BR" sz="800" b="1" dirty="0"/>
-                  <a:t>Temperatura C°</a:t>
-                </a:r>
-              </a:p>
-            </p:txBody>
-          </p:sp>
-          <p:sp>
-            <p:nvSpPr>
-              <p:cNvPr id="680" name="Rectangle 679">
-                <a:extLst>
-                  <a:ext uri="{FF2B5EF4-FFF2-40B4-BE49-F238E27FC236}">
-                    <a16:creationId xmlns:a16="http://schemas.microsoft.com/office/drawing/2014/main" id="{C6B0E7E0-1F73-2DA1-4D1D-BC12EA0976DD}"/>
-                  </a:ext>
-                </a:extLst>
-              </p:cNvPr>
-              <p:cNvSpPr/>
-              <p:nvPr/>
-            </p:nvSpPr>
-            <p:spPr>
-              <a:xfrm>
-                <a:off x="2082354" y="1118524"/>
-                <a:ext cx="804451" cy="184989"/>
-              </a:xfrm>
-              <a:prstGeom prst="rect">
-                <a:avLst/>
-              </a:prstGeom>
-              <a:solidFill>
-                <a:schemeClr val="bg1"/>
-              </a:solidFill>
-              <a:ln>
-                <a:solidFill>
-                  <a:schemeClr val="bg2">
-                    <a:lumMod val="90000"/>
-                  </a:schemeClr>
-                </a:solidFill>
-              </a:ln>
-            </p:spPr>
-            <p:style>
-              <a:lnRef idx="2">
-                <a:schemeClr val="accent1">
-                  <a:shade val="50000"/>
-                </a:schemeClr>
-              </a:lnRef>
-              <a:fillRef idx="1">
-                <a:schemeClr val="accent1"/>
-              </a:fillRef>
-              <a:effectRef idx="0">
-                <a:schemeClr val="accent1"/>
-              </a:effectRef>
-              <a:fontRef idx="minor">
-                <a:schemeClr val="lt1"/>
-              </a:fontRef>
-            </p:style>
-            <p:txBody>
-              <a:bodyPr rtlCol="0" anchor="ctr"/>
-              <a:lstStyle/>
-              <a:p>
-                <a:pPr algn="ctr"/>
-                <a:endParaRPr lang="pt-BR" sz="1600"/>
-              </a:p>
-            </p:txBody>
-          </p:sp>
-        </p:grpSp>
-      </p:grpSp>
-      <p:sp>
-        <p:nvSpPr>
-          <p:cNvPr id="239" name="Rectangle 238">
-            <a:extLst>
-              <a:ext uri="{FF2B5EF4-FFF2-40B4-BE49-F238E27FC236}">
-                <a16:creationId xmlns:a16="http://schemas.microsoft.com/office/drawing/2014/main" id="{24868480-EC22-0E06-3FBB-62B8598C78B2}"/>
-              </a:ext>
-            </a:extLst>
-          </p:cNvPr>
-          <p:cNvSpPr/>
-          <p:nvPr/>
-        </p:nvSpPr>
-        <p:spPr>
-          <a:xfrm>
-            <a:off x="8769585" y="6229248"/>
-            <a:ext cx="175072" cy="168172"/>
-          </a:xfrm>
-          <a:prstGeom prst="rect">
-            <a:avLst/>
-          </a:prstGeom>
-          <a:solidFill>
-            <a:schemeClr val="bg1"/>
-          </a:solidFill>
-          <a:ln>
-            <a:solidFill>
-              <a:schemeClr val="bg2">
-                <a:lumMod val="90000"/>
-              </a:schemeClr>
-            </a:solidFill>
-          </a:ln>
-        </p:spPr>
-        <p:style>
-          <a:lnRef idx="2">
-            <a:schemeClr val="accent1">
-              <a:shade val="50000"/>
-            </a:schemeClr>
-          </a:lnRef>
-          <a:fillRef idx="1">
-            <a:schemeClr val="accent1"/>
-          </a:fillRef>
-          <a:effectRef idx="0">
-            <a:schemeClr val="accent1"/>
-          </a:effectRef>
-          <a:fontRef idx="minor">
-            <a:schemeClr val="lt1"/>
-          </a:fontRef>
-        </p:style>
-        <p:txBody>
-          <a:bodyPr rtlCol="0" anchor="ctr"/>
-          <a:lstStyle/>
-          <a:p>
-            <a:pPr algn="ctr"/>
-            <a:endParaRPr lang="pt-BR" sz="1600"/>
           </a:p>
         </p:txBody>
       </p:sp>
@@ -48502,6 +47998,192 @@
             <a:p>
               <a:pPr algn="ctr"/>
               <a:endParaRPr lang="pt-BR" sz="1600"/>
+            </a:p>
+          </p:txBody>
+        </p:sp>
+      </p:grpSp>
+      <p:grpSp>
+        <p:nvGrpSpPr>
+          <p:cNvPr id="6" name="Group 5">
+            <a:extLst>
+              <a:ext uri="{FF2B5EF4-FFF2-40B4-BE49-F238E27FC236}">
+                <a16:creationId xmlns:a16="http://schemas.microsoft.com/office/drawing/2014/main" id="{4E8E76D5-541C-73C2-EF2B-D9AF78719095}"/>
+              </a:ext>
+            </a:extLst>
+          </p:cNvPr>
+          <p:cNvGrpSpPr/>
+          <p:nvPr/>
+        </p:nvGrpSpPr>
+        <p:grpSpPr>
+          <a:xfrm>
+            <a:off x="8383664" y="4506034"/>
+            <a:ext cx="1523205" cy="1163203"/>
+            <a:chOff x="2053347" y="2489981"/>
+            <a:chExt cx="1523205" cy="1163203"/>
+          </a:xfrm>
+        </p:grpSpPr>
+        <p:sp>
+          <p:nvSpPr>
+            <p:cNvPr id="2" name="TextBox 1">
+              <a:extLst>
+                <a:ext uri="{FF2B5EF4-FFF2-40B4-BE49-F238E27FC236}">
+                  <a16:creationId xmlns:a16="http://schemas.microsoft.com/office/drawing/2014/main" id="{55DB3AAF-27ED-B397-07F7-3BC0DC8633E9}"/>
+                </a:ext>
+              </a:extLst>
+            </p:cNvPr>
+            <p:cNvSpPr txBox="1"/>
+            <p:nvPr/>
+          </p:nvSpPr>
+          <p:spPr>
+            <a:xfrm>
+              <a:off x="3053652" y="2489981"/>
+              <a:ext cx="522900" cy="307777"/>
+            </a:xfrm>
+            <a:prstGeom prst="rect">
+              <a:avLst/>
+            </a:prstGeom>
+            <a:noFill/>
+            <a:ln>
+              <a:noFill/>
+              <a:prstDash val="dash"/>
+            </a:ln>
+          </p:spPr>
+          <p:txBody>
+            <a:bodyPr wrap="none" rtlCol="0">
+              <a:spAutoFit/>
+            </a:bodyPr>
+            <a:lstStyle>
+              <a:defPPr>
+                <a:defRPr lang="pt-BR"/>
+              </a:defPPr>
+              <a:lvl1pPr>
+                <a:defRPr sz="800" b="1"/>
+              </a:lvl1pPr>
+            </a:lstStyle>
+            <a:p>
+              <a:r>
+                <a:rPr lang="pt-BR" sz="1400" dirty="0">
+                  <a:cs typeface="Aharoni" panose="02010803020104030203" pitchFamily="2" charset="-79"/>
+                </a:rPr>
+                <a:t>TQ 3</a:t>
+              </a:r>
+            </a:p>
+          </p:txBody>
+        </p:sp>
+        <p:sp>
+          <p:nvSpPr>
+            <p:cNvPr id="3" name="TextBox 2">
+              <a:extLst>
+                <a:ext uri="{FF2B5EF4-FFF2-40B4-BE49-F238E27FC236}">
+                  <a16:creationId xmlns:a16="http://schemas.microsoft.com/office/drawing/2014/main" id="{F19C4BDB-E0F6-9FD3-CB46-A4EFC8133062}"/>
+                </a:ext>
+              </a:extLst>
+            </p:cNvPr>
+            <p:cNvSpPr txBox="1"/>
+            <p:nvPr/>
+          </p:nvSpPr>
+          <p:spPr>
+            <a:xfrm>
+              <a:off x="2053347" y="2686502"/>
+              <a:ext cx="742511" cy="215444"/>
+            </a:xfrm>
+            <a:prstGeom prst="rect">
+              <a:avLst/>
+            </a:prstGeom>
+            <a:noFill/>
+            <a:ln>
+              <a:noFill/>
+              <a:prstDash val="dash"/>
+            </a:ln>
+          </p:spPr>
+          <p:txBody>
+            <a:bodyPr wrap="none" rtlCol="0">
+              <a:spAutoFit/>
+            </a:bodyPr>
+            <a:lstStyle/>
+            <a:p>
+              <a:r>
+                <a:rPr lang="pt-BR" sz="800" b="1" dirty="0"/>
+                <a:t>Nível Tanque</a:t>
+              </a:r>
+            </a:p>
+          </p:txBody>
+        </p:sp>
+        <p:sp>
+          <p:nvSpPr>
+            <p:cNvPr id="4" name="TextBox 3">
+              <a:extLst>
+                <a:ext uri="{FF2B5EF4-FFF2-40B4-BE49-F238E27FC236}">
+                  <a16:creationId xmlns:a16="http://schemas.microsoft.com/office/drawing/2014/main" id="{D2CF43F8-2775-7EE4-2271-0DE9706FB3E7}"/>
+                </a:ext>
+              </a:extLst>
+            </p:cNvPr>
+            <p:cNvSpPr txBox="1"/>
+            <p:nvPr/>
+          </p:nvSpPr>
+          <p:spPr>
+            <a:xfrm>
+              <a:off x="2053347" y="3033840"/>
+              <a:ext cx="644728" cy="215444"/>
+            </a:xfrm>
+            <a:prstGeom prst="rect">
+              <a:avLst/>
+            </a:prstGeom>
+            <a:noFill/>
+            <a:ln>
+              <a:noFill/>
+              <a:prstDash val="dash"/>
+            </a:ln>
+          </p:spPr>
+          <p:txBody>
+            <a:bodyPr wrap="none" rtlCol="0">
+              <a:spAutoFit/>
+            </a:bodyPr>
+            <a:lstStyle/>
+            <a:p>
+              <a:r>
+                <a:rPr lang="pt-BR" sz="800" b="1" dirty="0"/>
+                <a:t>Volume (L)</a:t>
+              </a:r>
+            </a:p>
+          </p:txBody>
+        </p:sp>
+        <p:sp>
+          <p:nvSpPr>
+            <p:cNvPr id="5" name="TextBox 4">
+              <a:extLst>
+                <a:ext uri="{FF2B5EF4-FFF2-40B4-BE49-F238E27FC236}">
+                  <a16:creationId xmlns:a16="http://schemas.microsoft.com/office/drawing/2014/main" id="{9A6DE3BE-B965-CCB9-927C-99CC9F61CF89}"/>
+                </a:ext>
+              </a:extLst>
+            </p:cNvPr>
+            <p:cNvSpPr txBox="1"/>
+            <p:nvPr/>
+          </p:nvSpPr>
+          <p:spPr>
+            <a:xfrm>
+              <a:off x="2053347" y="3437740"/>
+              <a:ext cx="742511" cy="215444"/>
+            </a:xfrm>
+            <a:prstGeom prst="rect">
+              <a:avLst/>
+            </a:prstGeom>
+            <a:noFill/>
+            <a:ln>
+              <a:noFill/>
+              <a:prstDash val="dash"/>
+            </a:ln>
+          </p:spPr>
+          <p:txBody>
+            <a:bodyPr wrap="none" rtlCol="0">
+              <a:spAutoFit/>
+            </a:bodyPr>
+            <a:lstStyle/>
+            <a:p>
+              <a:r>
+                <a:rPr lang="pt-BR" sz="800" b="1" dirty="0"/>
+                <a:t>Temperatura</a:t>
+              </a:r>
             </a:p>
           </p:txBody>
         </p:sp>

</xml_diff>

<commit_message>
Lab 02 - Test TQ3 - Transfer
</commit_message>
<xml_diff>
--- a/lab02/scada-lts/views/LAB_2-Scada_View.pptx
+++ b/lab02/scada-lts/views/LAB_2-Scada_View.pptx
@@ -263,7 +263,7 @@
           <a:p>
             <a:fld id="{7BB6E4EC-387F-4E42-9D5E-93AEBED950C0}" type="datetimeFigureOut">
               <a:rPr lang="pt-BR" smtClean="0"/>
-              <a:t>30/06/2023</a:t>
+              <a:t>03/07/2023</a:t>
             </a:fld>
             <a:endParaRPr lang="pt-BR"/>
           </a:p>
@@ -463,7 +463,7 @@
           <a:p>
             <a:fld id="{7BB6E4EC-387F-4E42-9D5E-93AEBED950C0}" type="datetimeFigureOut">
               <a:rPr lang="pt-BR" smtClean="0"/>
-              <a:t>30/06/2023</a:t>
+              <a:t>03/07/2023</a:t>
             </a:fld>
             <a:endParaRPr lang="pt-BR"/>
           </a:p>
@@ -673,7 +673,7 @@
           <a:p>
             <a:fld id="{7BB6E4EC-387F-4E42-9D5E-93AEBED950C0}" type="datetimeFigureOut">
               <a:rPr lang="pt-BR" smtClean="0"/>
-              <a:t>30/06/2023</a:t>
+              <a:t>03/07/2023</a:t>
             </a:fld>
             <a:endParaRPr lang="pt-BR"/>
           </a:p>
@@ -873,7 +873,7 @@
           <a:p>
             <a:fld id="{7BB6E4EC-387F-4E42-9D5E-93AEBED950C0}" type="datetimeFigureOut">
               <a:rPr lang="pt-BR" smtClean="0"/>
-              <a:t>30/06/2023</a:t>
+              <a:t>03/07/2023</a:t>
             </a:fld>
             <a:endParaRPr lang="pt-BR"/>
           </a:p>
@@ -1149,7 +1149,7 @@
           <a:p>
             <a:fld id="{7BB6E4EC-387F-4E42-9D5E-93AEBED950C0}" type="datetimeFigureOut">
               <a:rPr lang="pt-BR" smtClean="0"/>
-              <a:t>30/06/2023</a:t>
+              <a:t>03/07/2023</a:t>
             </a:fld>
             <a:endParaRPr lang="pt-BR"/>
           </a:p>
@@ -1417,7 +1417,7 @@
           <a:p>
             <a:fld id="{7BB6E4EC-387F-4E42-9D5E-93AEBED950C0}" type="datetimeFigureOut">
               <a:rPr lang="pt-BR" smtClean="0"/>
-              <a:t>30/06/2023</a:t>
+              <a:t>03/07/2023</a:t>
             </a:fld>
             <a:endParaRPr lang="pt-BR"/>
           </a:p>
@@ -1832,7 +1832,7 @@
           <a:p>
             <a:fld id="{7BB6E4EC-387F-4E42-9D5E-93AEBED950C0}" type="datetimeFigureOut">
               <a:rPr lang="pt-BR" smtClean="0"/>
-              <a:t>30/06/2023</a:t>
+              <a:t>03/07/2023</a:t>
             </a:fld>
             <a:endParaRPr lang="pt-BR"/>
           </a:p>
@@ -1974,7 +1974,7 @@
           <a:p>
             <a:fld id="{7BB6E4EC-387F-4E42-9D5E-93AEBED950C0}" type="datetimeFigureOut">
               <a:rPr lang="pt-BR" smtClean="0"/>
-              <a:t>30/06/2023</a:t>
+              <a:t>03/07/2023</a:t>
             </a:fld>
             <a:endParaRPr lang="pt-BR"/>
           </a:p>
@@ -2087,7 +2087,7 @@
           <a:p>
             <a:fld id="{7BB6E4EC-387F-4E42-9D5E-93AEBED950C0}" type="datetimeFigureOut">
               <a:rPr lang="pt-BR" smtClean="0"/>
-              <a:t>30/06/2023</a:t>
+              <a:t>03/07/2023</a:t>
             </a:fld>
             <a:endParaRPr lang="pt-BR"/>
           </a:p>
@@ -2400,7 +2400,7 @@
           <a:p>
             <a:fld id="{7BB6E4EC-387F-4E42-9D5E-93AEBED950C0}" type="datetimeFigureOut">
               <a:rPr lang="pt-BR" smtClean="0"/>
-              <a:t>30/06/2023</a:t>
+              <a:t>03/07/2023</a:t>
             </a:fld>
             <a:endParaRPr lang="pt-BR"/>
           </a:p>
@@ -2689,7 +2689,7 @@
           <a:p>
             <a:fld id="{7BB6E4EC-387F-4E42-9D5E-93AEBED950C0}" type="datetimeFigureOut">
               <a:rPr lang="pt-BR" smtClean="0"/>
-              <a:t>30/06/2023</a:t>
+              <a:t>03/07/2023</a:t>
             </a:fld>
             <a:endParaRPr lang="pt-BR"/>
           </a:p>
@@ -2932,7 +2932,7 @@
           <a:p>
             <a:fld id="{7BB6E4EC-387F-4E42-9D5E-93AEBED950C0}" type="datetimeFigureOut">
               <a:rPr lang="pt-BR" smtClean="0"/>
-              <a:t>30/06/2023</a:t>
+              <a:t>03/07/2023</a:t>
             </a:fld>
             <a:endParaRPr lang="pt-BR"/>
           </a:p>
@@ -42118,11 +42118,7 @@
           </a:prstGeom>
           <a:noFill/>
           <a:ln>
-            <a:solidFill>
-              <a:schemeClr val="bg1">
-                <a:lumMod val="85000"/>
-              </a:schemeClr>
-            </a:solidFill>
+            <a:noFill/>
             <a:prstDash val="dash"/>
           </a:ln>
         </p:spPr>

</xml_diff>

<commit_message>
Lab 02 - Ajustes Contagem de Lote
</commit_message>
<xml_diff>
--- a/lab02/scada-lts/views/LAB_2-Scada_View.pptx
+++ b/lab02/scada-lts/views/LAB_2-Scada_View.pptx
@@ -263,7 +263,7 @@
           <a:p>
             <a:fld id="{7BB6E4EC-387F-4E42-9D5E-93AEBED950C0}" type="datetimeFigureOut">
               <a:rPr lang="pt-BR" smtClean="0"/>
-              <a:t>06/07/2023</a:t>
+              <a:t>28/08/2023</a:t>
             </a:fld>
             <a:endParaRPr lang="pt-BR"/>
           </a:p>
@@ -463,7 +463,7 @@
           <a:p>
             <a:fld id="{7BB6E4EC-387F-4E42-9D5E-93AEBED950C0}" type="datetimeFigureOut">
               <a:rPr lang="pt-BR" smtClean="0"/>
-              <a:t>06/07/2023</a:t>
+              <a:t>28/08/2023</a:t>
             </a:fld>
             <a:endParaRPr lang="pt-BR"/>
           </a:p>
@@ -673,7 +673,7 @@
           <a:p>
             <a:fld id="{7BB6E4EC-387F-4E42-9D5E-93AEBED950C0}" type="datetimeFigureOut">
               <a:rPr lang="pt-BR" smtClean="0"/>
-              <a:t>06/07/2023</a:t>
+              <a:t>28/08/2023</a:t>
             </a:fld>
             <a:endParaRPr lang="pt-BR"/>
           </a:p>
@@ -873,7 +873,7 @@
           <a:p>
             <a:fld id="{7BB6E4EC-387F-4E42-9D5E-93AEBED950C0}" type="datetimeFigureOut">
               <a:rPr lang="pt-BR" smtClean="0"/>
-              <a:t>06/07/2023</a:t>
+              <a:t>28/08/2023</a:t>
             </a:fld>
             <a:endParaRPr lang="pt-BR"/>
           </a:p>
@@ -1149,7 +1149,7 @@
           <a:p>
             <a:fld id="{7BB6E4EC-387F-4E42-9D5E-93AEBED950C0}" type="datetimeFigureOut">
               <a:rPr lang="pt-BR" smtClean="0"/>
-              <a:t>06/07/2023</a:t>
+              <a:t>28/08/2023</a:t>
             </a:fld>
             <a:endParaRPr lang="pt-BR"/>
           </a:p>
@@ -1417,7 +1417,7 @@
           <a:p>
             <a:fld id="{7BB6E4EC-387F-4E42-9D5E-93AEBED950C0}" type="datetimeFigureOut">
               <a:rPr lang="pt-BR" smtClean="0"/>
-              <a:t>06/07/2023</a:t>
+              <a:t>28/08/2023</a:t>
             </a:fld>
             <a:endParaRPr lang="pt-BR"/>
           </a:p>
@@ -1832,7 +1832,7 @@
           <a:p>
             <a:fld id="{7BB6E4EC-387F-4E42-9D5E-93AEBED950C0}" type="datetimeFigureOut">
               <a:rPr lang="pt-BR" smtClean="0"/>
-              <a:t>06/07/2023</a:t>
+              <a:t>28/08/2023</a:t>
             </a:fld>
             <a:endParaRPr lang="pt-BR"/>
           </a:p>
@@ -1974,7 +1974,7 @@
           <a:p>
             <a:fld id="{7BB6E4EC-387F-4E42-9D5E-93AEBED950C0}" type="datetimeFigureOut">
               <a:rPr lang="pt-BR" smtClean="0"/>
-              <a:t>06/07/2023</a:t>
+              <a:t>28/08/2023</a:t>
             </a:fld>
             <a:endParaRPr lang="pt-BR"/>
           </a:p>
@@ -2087,7 +2087,7 @@
           <a:p>
             <a:fld id="{7BB6E4EC-387F-4E42-9D5E-93AEBED950C0}" type="datetimeFigureOut">
               <a:rPr lang="pt-BR" smtClean="0"/>
-              <a:t>06/07/2023</a:t>
+              <a:t>28/08/2023</a:t>
             </a:fld>
             <a:endParaRPr lang="pt-BR"/>
           </a:p>
@@ -2400,7 +2400,7 @@
           <a:p>
             <a:fld id="{7BB6E4EC-387F-4E42-9D5E-93AEBED950C0}" type="datetimeFigureOut">
               <a:rPr lang="pt-BR" smtClean="0"/>
-              <a:t>06/07/2023</a:t>
+              <a:t>28/08/2023</a:t>
             </a:fld>
             <a:endParaRPr lang="pt-BR"/>
           </a:p>
@@ -2689,7 +2689,7 @@
           <a:p>
             <a:fld id="{7BB6E4EC-387F-4E42-9D5E-93AEBED950C0}" type="datetimeFigureOut">
               <a:rPr lang="pt-BR" smtClean="0"/>
-              <a:t>06/07/2023</a:t>
+              <a:t>28/08/2023</a:t>
             </a:fld>
             <a:endParaRPr lang="pt-BR"/>
           </a:p>
@@ -2932,7 +2932,7 @@
           <a:p>
             <a:fld id="{7BB6E4EC-387F-4E42-9D5E-93AEBED950C0}" type="datetimeFigureOut">
               <a:rPr lang="pt-BR" smtClean="0"/>
-              <a:t>06/07/2023</a:t>
+              <a:t>28/08/2023</a:t>
             </a:fld>
             <a:endParaRPr lang="pt-BR"/>
           </a:p>
@@ -39691,7 +39691,22 @@
             <a:lstStyle/>
             <a:p>
               <a:pPr algn="ctr"/>
-              <a:endParaRPr lang="pt-BR" sz="1600"/>
+              <a:r>
+                <a:rPr lang="pt-BR" sz="800" dirty="0">
+                  <a:solidFill>
+                    <a:schemeClr val="tx1"/>
+                  </a:solidFill>
+                </a:rPr>
+                <a:t>PRODUTO </a:t>
+              </a:r>
+              <a:r>
+                <a:rPr lang="pt-BR" sz="800" b="1" dirty="0">
+                  <a:solidFill>
+                    <a:schemeClr val="tx1"/>
+                  </a:solidFill>
+                </a:rPr>
+                <a:t>A</a:t>
+              </a:r>
             </a:p>
           </p:txBody>
         </p:sp>
@@ -47671,7 +47686,27 @@
             <a:lstStyle/>
             <a:p>
               <a:pPr algn="ctr"/>
-              <a:endParaRPr lang="pt-BR" sz="1600"/>
+              <a:r>
+                <a:rPr lang="pt-BR" sz="800" dirty="0">
+                  <a:solidFill>
+                    <a:schemeClr val="tx1"/>
+                  </a:solidFill>
+                </a:rPr>
+                <a:t>PRODUTO </a:t>
+              </a:r>
+              <a:r>
+                <a:rPr lang="pt-BR" sz="800" b="1" dirty="0">
+                  <a:solidFill>
+                    <a:schemeClr val="tx1"/>
+                  </a:solidFill>
+                </a:rPr>
+                <a:t>B</a:t>
+              </a:r>
+              <a:endParaRPr lang="pt-BR" sz="800" dirty="0">
+                <a:solidFill>
+                  <a:schemeClr val="tx1"/>
+                </a:solidFill>
+              </a:endParaRPr>
             </a:p>
           </p:txBody>
         </p:sp>
@@ -48151,8 +48186,8 @@
         </p:nvSpPr>
         <p:spPr>
           <a:xfrm>
-            <a:off x="10588682" y="6351588"/>
-            <a:ext cx="500458" cy="215444"/>
+            <a:off x="9646652" y="6351588"/>
+            <a:ext cx="1442489" cy="215444"/>
           </a:xfrm>
           <a:prstGeom prst="rect">
             <a:avLst/>
@@ -48164,11 +48199,12 @@
           </a:ln>
         </p:spPr>
         <p:txBody>
-          <a:bodyPr wrap="none" rtlCol="0">
+          <a:bodyPr wrap="square" rtlCol="0">
             <a:spAutoFit/>
           </a:bodyPr>
           <a:lstStyle/>
           <a:p>
+            <a:pPr algn="r"/>
             <a:r>
               <a:rPr lang="pt-BR" sz="800" dirty="0">
                 <a:solidFill>
@@ -48177,7 +48213,7 @@
                   </a:schemeClr>
                 </a:solidFill>
               </a:rPr>
-              <a:t>LITROS:</a:t>
+              <a:t>LITROS - TRANSFERENCIA:</a:t>
             </a:r>
             <a:endParaRPr lang="pt-BR" sz="800" b="1" dirty="0">
               <a:solidFill>
@@ -48203,8 +48239,8 @@
         </p:nvSpPr>
         <p:spPr>
           <a:xfrm>
-            <a:off x="10591568" y="6596845"/>
-            <a:ext cx="468398" cy="215444"/>
+            <a:off x="9921546" y="6596844"/>
+            <a:ext cx="1167594" cy="215444"/>
           </a:xfrm>
           <a:prstGeom prst="rect">
             <a:avLst/>
@@ -48216,11 +48252,12 @@
           </a:ln>
         </p:spPr>
         <p:txBody>
-          <a:bodyPr wrap="none" rtlCol="0">
+          <a:bodyPr wrap="square" rtlCol="0">
             <a:spAutoFit/>
           </a:bodyPr>
           <a:lstStyle/>
           <a:p>
+            <a:pPr algn="r"/>
             <a:r>
               <a:rPr lang="pt-BR" sz="800" dirty="0">
                 <a:solidFill>
@@ -48229,7 +48266,7 @@
                   </a:schemeClr>
                 </a:solidFill>
               </a:rPr>
-              <a:t>LOTES:</a:t>
+              <a:t>TOTAL LOTES:</a:t>
             </a:r>
             <a:endParaRPr lang="pt-BR" sz="800" b="1" dirty="0">
               <a:solidFill>
@@ -48241,6 +48278,130 @@
           </a:p>
         </p:txBody>
       </p:sp>
+      <p:grpSp>
+        <p:nvGrpSpPr>
+          <p:cNvPr id="9" name="Group 8">
+            <a:extLst>
+              <a:ext uri="{FF2B5EF4-FFF2-40B4-BE49-F238E27FC236}">
+                <a16:creationId xmlns:a16="http://schemas.microsoft.com/office/drawing/2014/main" id="{A6150111-8255-2B8D-D3D1-9CD47CF101E2}"/>
+              </a:ext>
+            </a:extLst>
+          </p:cNvPr>
+          <p:cNvGrpSpPr/>
+          <p:nvPr/>
+        </p:nvGrpSpPr>
+        <p:grpSpPr>
+          <a:xfrm>
+            <a:off x="8842423" y="3999654"/>
+            <a:ext cx="639223" cy="349471"/>
+            <a:chOff x="2834176" y="4244525"/>
+            <a:chExt cx="703145" cy="384418"/>
+          </a:xfrm>
+        </p:grpSpPr>
+        <p:sp>
+          <p:nvSpPr>
+            <p:cNvPr id="10" name="TextBox 9">
+              <a:extLst>
+                <a:ext uri="{FF2B5EF4-FFF2-40B4-BE49-F238E27FC236}">
+                  <a16:creationId xmlns:a16="http://schemas.microsoft.com/office/drawing/2014/main" id="{151D2642-0490-B0F0-C92E-880C90E532E6}"/>
+                </a:ext>
+              </a:extLst>
+            </p:cNvPr>
+            <p:cNvSpPr txBox="1"/>
+            <p:nvPr/>
+          </p:nvSpPr>
+          <p:spPr>
+            <a:xfrm>
+              <a:off x="2834176" y="4244525"/>
+              <a:ext cx="696861" cy="236988"/>
+            </a:xfrm>
+            <a:prstGeom prst="rect">
+              <a:avLst/>
+            </a:prstGeom>
+            <a:noFill/>
+            <a:ln>
+              <a:noFill/>
+              <a:prstDash val="dash"/>
+            </a:ln>
+          </p:spPr>
+          <p:txBody>
+            <a:bodyPr wrap="square" rtlCol="0">
+              <a:spAutoFit/>
+            </a:bodyPr>
+            <a:lstStyle/>
+            <a:p>
+              <a:pPr algn="ctr"/>
+              <a:r>
+                <a:rPr lang="pt-BR" sz="800" b="1" dirty="0"/>
+                <a:t>Mistura</a:t>
+              </a:r>
+            </a:p>
+          </p:txBody>
+        </p:sp>
+        <p:sp>
+          <p:nvSpPr>
+            <p:cNvPr id="11" name="Rectangle 10">
+              <a:extLst>
+                <a:ext uri="{FF2B5EF4-FFF2-40B4-BE49-F238E27FC236}">
+                  <a16:creationId xmlns:a16="http://schemas.microsoft.com/office/drawing/2014/main" id="{486E8E23-F553-48D8-0DA8-5BD7549A0DEB}"/>
+                </a:ext>
+              </a:extLst>
+            </p:cNvPr>
+            <p:cNvSpPr/>
+            <p:nvPr/>
+          </p:nvSpPr>
+          <p:spPr>
+            <a:xfrm>
+              <a:off x="2840461" y="4441616"/>
+              <a:ext cx="696860" cy="187327"/>
+            </a:xfrm>
+            <a:prstGeom prst="rect">
+              <a:avLst/>
+            </a:prstGeom>
+            <a:solidFill>
+              <a:schemeClr val="bg1"/>
+            </a:solidFill>
+            <a:ln>
+              <a:solidFill>
+                <a:schemeClr val="bg2">
+                  <a:lumMod val="90000"/>
+                </a:schemeClr>
+              </a:solidFill>
+            </a:ln>
+          </p:spPr>
+          <p:style>
+            <a:lnRef idx="2">
+              <a:schemeClr val="accent1">
+                <a:shade val="50000"/>
+              </a:schemeClr>
+            </a:lnRef>
+            <a:fillRef idx="1">
+              <a:schemeClr val="accent1"/>
+            </a:fillRef>
+            <a:effectRef idx="0">
+              <a:schemeClr val="accent1"/>
+            </a:effectRef>
+            <a:fontRef idx="minor">
+              <a:schemeClr val="lt1"/>
+            </a:fontRef>
+          </p:style>
+          <p:txBody>
+            <a:bodyPr rtlCol="0" anchor="ctr"/>
+            <a:lstStyle/>
+            <a:p>
+              <a:pPr algn="ctr"/>
+              <a:r>
+                <a:rPr lang="pt-BR" sz="1000" b="1" dirty="0">
+                  <a:solidFill>
+                    <a:schemeClr val="tx1"/>
+                  </a:solidFill>
+                </a:rPr>
+                <a:t>2A+1B</a:t>
+              </a:r>
+            </a:p>
+          </p:txBody>
+        </p:sp>
+      </p:grpSp>
     </p:spTree>
     <p:extLst>
       <p:ext uri="{BB962C8B-B14F-4D97-AF65-F5344CB8AC3E}">

</xml_diff>

<commit_message>
Lab 02 - Logo Pöyry
</commit_message>
<xml_diff>
--- a/lab02/scada-lts/views/LAB_2-Scada_View.pptx
+++ b/lab02/scada-lts/views/LAB_2-Scada_View.pptx
@@ -33916,42 +33916,7 @@
           <a:p>
             <a:r>
               <a:rPr lang="pt-BR" dirty="0"/>
-              <a:t>LAB 2 – Simulador de dados do Processo.</a:t>
-            </a:r>
-          </a:p>
-        </p:txBody>
-      </p:sp>
-      <p:sp>
-        <p:nvSpPr>
-          <p:cNvPr id="246" name="TextBox 245">
-            <a:extLst>
-              <a:ext uri="{FF2B5EF4-FFF2-40B4-BE49-F238E27FC236}">
-                <a16:creationId xmlns:a16="http://schemas.microsoft.com/office/drawing/2014/main" id="{75B2E6E0-5D94-978D-8305-C944245487CD}"/>
-              </a:ext>
-            </a:extLst>
-          </p:cNvPr>
-          <p:cNvSpPr txBox="1"/>
-          <p:nvPr/>
-        </p:nvSpPr>
-        <p:spPr>
-          <a:xfrm>
-            <a:off x="11218522" y="43375"/>
-            <a:ext cx="913199" cy="369332"/>
-          </a:xfrm>
-          <a:prstGeom prst="rect">
-            <a:avLst/>
-          </a:prstGeom>
-          <a:noFill/>
-        </p:spPr>
-        <p:txBody>
-          <a:bodyPr wrap="none" rtlCol="0">
-            <a:spAutoFit/>
-          </a:bodyPr>
-          <a:lstStyle/>
-          <a:p>
-            <a:r>
-              <a:rPr lang="pt-BR" dirty="0"/>
-              <a:t>FIWARE</a:t>
+              <a:t>LAB 2 – Simulador de dados de Processo.</a:t>
             </a:r>
           </a:p>
         </p:txBody>
@@ -48396,12 +48361,72 @@
                     <a:schemeClr val="tx1"/>
                   </a:solidFill>
                 </a:rPr>
-                <a:t>2A+1B</a:t>
+                <a:t>1A+2B</a:t>
               </a:r>
             </a:p>
           </p:txBody>
         </p:sp>
       </p:grpSp>
+      <p:pic>
+        <p:nvPicPr>
+          <p:cNvPr id="29" name="Imagem 4" descr="Uma imagem contendo Ícone&#10;&#10;Descrição gerada automaticamente">
+            <a:extLst>
+              <a:ext uri="{FF2B5EF4-FFF2-40B4-BE49-F238E27FC236}">
+                <a16:creationId xmlns:a16="http://schemas.microsoft.com/office/drawing/2014/main" id="{F971F132-6609-CCC0-A6B3-7CD3D83BAFE8}"/>
+              </a:ext>
+            </a:extLst>
+          </p:cNvPr>
+          <p:cNvPicPr>
+            <a:picLocks noChangeAspect="1" noChangeArrowheads="1"/>
+          </p:cNvPicPr>
+          <p:nvPr/>
+        </p:nvPicPr>
+        <p:blipFill>
+          <a:blip r:embed="rId2">
+            <a:extLst>
+              <a:ext uri="{28A0092B-C50C-407E-A947-70E740481C1C}">
+                <a14:useLocalDpi xmlns:a14="http://schemas.microsoft.com/office/drawing/2010/main" val="0"/>
+              </a:ext>
+            </a:extLst>
+          </a:blip>
+          <a:srcRect/>
+          <a:stretch>
+            <a:fillRect/>
+          </a:stretch>
+        </p:blipFill>
+        <p:spPr bwMode="auto">
+          <a:xfrm>
+            <a:off x="10785803" y="107402"/>
+            <a:ext cx="1328737" cy="247650"/>
+          </a:xfrm>
+          <a:prstGeom prst="rect">
+            <a:avLst/>
+          </a:prstGeom>
+          <a:noFill/>
+          <a:ln>
+            <a:noFill/>
+          </a:ln>
+          <a:extLst>
+            <a:ext uri="{909E8E84-426E-40DD-AFC4-6F175D3DCCD1}">
+              <a14:hiddenFill xmlns:a14="http://schemas.microsoft.com/office/drawing/2010/main">
+                <a:solidFill>
+                  <a:srgbClr val="FFFFFF"/>
+                </a:solidFill>
+              </a14:hiddenFill>
+            </a:ext>
+            <a:ext uri="{91240B29-F687-4F45-9708-019B960494DF}">
+              <a14:hiddenLine xmlns:a14="http://schemas.microsoft.com/office/drawing/2010/main" w="9525">
+                <a:solidFill>
+                  <a:srgbClr val="000000"/>
+                </a:solidFill>
+                <a:miter lim="800000"/>
+                <a:headEnd/>
+                <a:tailEnd/>
+              </a14:hiddenLine>
+            </a:ext>
+          </a:extLst>
+        </p:spPr>
+      </p:pic>
     </p:spTree>
     <p:extLst>
       <p:ext uri="{BB962C8B-B14F-4D97-AF65-F5344CB8AC3E}">

</xml_diff>